<commit_message>
Update Algebra Marks the Spot Final Presentation.pptx
</commit_message>
<xml_diff>
--- a/Algebra Marks the Spot Final Presentation.pptx
+++ b/Algebra Marks the Spot Final Presentation.pptx
@@ -113,6 +113,11 @@
       </a:defRPr>
     </a:lvl9pPr>
   </p:defaultTextStyle>
+  <p:extLst>
+    <p:ext uri="{EFAFB233-063F-42B5-8137-9DF3F51BA10A}">
+      <p15:sldGuideLst xmlns:p15="http://schemas.microsoft.com/office/powerpoint/2012/main"/>
+    </p:ext>
+  </p:extLst>
 </p:presentation>
 </file>
 
@@ -6100,8 +6105,8 @@
         <a:lstStyle/>
         <a:p>
           <a:r>
-            <a:rPr lang="en-US"/>
-            <a:t>We allow the user to submit reviews of the game and how they felt about it</a:t>
+            <a:rPr lang="en-US" dirty="0"/>
+            <a:t>We allow the user to submit reviews of the game and how they felt about it, along with park reviews</a:t>
           </a:r>
         </a:p>
       </dgm:t>
@@ -6136,8 +6141,8 @@
         <a:lstStyle/>
         <a:p>
           <a:r>
-            <a:rPr lang="en-US"/>
-            <a:t>We did not include user images and park descriptions because we could not figure out how to create a filter to get around possibly inappropriate posts, so we just decided to not include it in the end</a:t>
+            <a:rPr lang="en-US" dirty="0"/>
+            <a:t>We did not include user images because we could not figure out how to create a filter to get around possibly inappropriate posts, so we just decided to not include it in the end</a:t>
           </a:r>
         </a:p>
       </dgm:t>
@@ -8081,8 +8086,8 @@
             <a:buNone/>
           </a:pPr>
           <a:r>
-            <a:rPr lang="en-US" sz="1700" kern="1200"/>
-            <a:t>We allow the user to submit reviews of the game and how they felt about it</a:t>
+            <a:rPr lang="en-US" sz="1700" kern="1200" dirty="0"/>
+            <a:t>We allow the user to submit reviews of the game and how they felt about it, along with park reviews</a:t>
           </a:r>
         </a:p>
       </dsp:txBody>
@@ -8231,8 +8236,8 @@
             <a:buNone/>
           </a:pPr>
           <a:r>
-            <a:rPr lang="en-US" sz="1700" kern="1200"/>
-            <a:t>We did not include user images and park descriptions because we could not figure out how to create a filter to get around possibly inappropriate posts, so we just decided to not include it in the end</a:t>
+            <a:rPr lang="en-US" sz="1700" kern="1200" dirty="0"/>
+            <a:t>We did not include user images because we could not figure out how to create a filter to get around possibly inappropriate posts, so we just decided to not include it in the end</a:t>
           </a:r>
         </a:p>
       </dsp:txBody>
@@ -26178,7 +26183,7 @@
             <p:ph idx="1"/>
             <p:extLst>
               <p:ext uri="{D42A27DB-BD31-4B8C-83A1-F6EECF244321}">
-                <p14:modId xmlns:p14="http://schemas.microsoft.com/office/powerpoint/2010/main" val="3962132761"/>
+                <p14:modId xmlns:p14="http://schemas.microsoft.com/office/powerpoint/2010/main" val="2666170028"/>
               </p:ext>
             </p:extLst>
           </p:nvPr>

</xml_diff>